<commit_message>
úprava prezentace podle PDF k obhajobě
</commit_message>
<xml_diff>
--- a/prezentace/DPR prezentace.pptx
+++ b/prezentace/DPR prezentace.pptx
@@ -8,14 +8,15 @@
     <p:sldId id="256" r:id="rId2"/>
     <p:sldId id="267" r:id="rId3"/>
     <p:sldId id="257" r:id="rId4"/>
-    <p:sldId id="266" r:id="rId5"/>
-    <p:sldId id="263" r:id="rId6"/>
+    <p:sldId id="263" r:id="rId5"/>
+    <p:sldId id="266" r:id="rId6"/>
     <p:sldId id="259" r:id="rId7"/>
     <p:sldId id="265" r:id="rId8"/>
     <p:sldId id="264" r:id="rId9"/>
-    <p:sldId id="260" r:id="rId10"/>
-    <p:sldId id="261" r:id="rId11"/>
-    <p:sldId id="262" r:id="rId12"/>
+    <p:sldId id="268" r:id="rId10"/>
+    <p:sldId id="260" r:id="rId11"/>
+    <p:sldId id="261" r:id="rId12"/>
+    <p:sldId id="262" r:id="rId13"/>
   </p:sldIdLst>
   <p:sldSz cx="12192000" cy="6858000"/>
   <p:notesSz cx="6858000" cy="9144000"/>
@@ -257,7 +258,7 @@
           <a:p>
             <a:fld id="{AC71B652-1057-46F3-ADB0-02ADCA82FBFB}" type="datetimeFigureOut">
               <a:rPr lang="cs-CZ" smtClean="0"/>
-              <a:t>07.05.2018</a:t>
+              <a:t>09.05.2018</a:t>
             </a:fld>
             <a:endParaRPr lang="cs-CZ"/>
           </a:p>
@@ -427,7 +428,7 @@
           <a:p>
             <a:fld id="{AC71B652-1057-46F3-ADB0-02ADCA82FBFB}" type="datetimeFigureOut">
               <a:rPr lang="cs-CZ" smtClean="0"/>
-              <a:t>07.05.2018</a:t>
+              <a:t>09.05.2018</a:t>
             </a:fld>
             <a:endParaRPr lang="cs-CZ"/>
           </a:p>
@@ -607,7 +608,7 @@
           <a:p>
             <a:fld id="{AC71B652-1057-46F3-ADB0-02ADCA82FBFB}" type="datetimeFigureOut">
               <a:rPr lang="cs-CZ" smtClean="0"/>
-              <a:t>07.05.2018</a:t>
+              <a:t>09.05.2018</a:t>
             </a:fld>
             <a:endParaRPr lang="cs-CZ"/>
           </a:p>
@@ -777,7 +778,7 @@
           <a:p>
             <a:fld id="{AC71B652-1057-46F3-ADB0-02ADCA82FBFB}" type="datetimeFigureOut">
               <a:rPr lang="cs-CZ" smtClean="0"/>
-              <a:t>07.05.2018</a:t>
+              <a:t>09.05.2018</a:t>
             </a:fld>
             <a:endParaRPr lang="cs-CZ"/>
           </a:p>
@@ -1023,7 +1024,7 @@
           <a:p>
             <a:fld id="{AC71B652-1057-46F3-ADB0-02ADCA82FBFB}" type="datetimeFigureOut">
               <a:rPr lang="cs-CZ" smtClean="0"/>
-              <a:t>07.05.2018</a:t>
+              <a:t>09.05.2018</a:t>
             </a:fld>
             <a:endParaRPr lang="cs-CZ"/>
           </a:p>
@@ -1255,7 +1256,7 @@
           <a:p>
             <a:fld id="{AC71B652-1057-46F3-ADB0-02ADCA82FBFB}" type="datetimeFigureOut">
               <a:rPr lang="cs-CZ" smtClean="0"/>
-              <a:t>07.05.2018</a:t>
+              <a:t>09.05.2018</a:t>
             </a:fld>
             <a:endParaRPr lang="cs-CZ"/>
           </a:p>
@@ -1622,7 +1623,7 @@
           <a:p>
             <a:fld id="{AC71B652-1057-46F3-ADB0-02ADCA82FBFB}" type="datetimeFigureOut">
               <a:rPr lang="cs-CZ" smtClean="0"/>
-              <a:t>07.05.2018</a:t>
+              <a:t>09.05.2018</a:t>
             </a:fld>
             <a:endParaRPr lang="cs-CZ"/>
           </a:p>
@@ -1740,7 +1741,7 @@
           <a:p>
             <a:fld id="{AC71B652-1057-46F3-ADB0-02ADCA82FBFB}" type="datetimeFigureOut">
               <a:rPr lang="cs-CZ" smtClean="0"/>
-              <a:t>07.05.2018</a:t>
+              <a:t>09.05.2018</a:t>
             </a:fld>
             <a:endParaRPr lang="cs-CZ"/>
           </a:p>
@@ -1835,7 +1836,7 @@
           <a:p>
             <a:fld id="{AC71B652-1057-46F3-ADB0-02ADCA82FBFB}" type="datetimeFigureOut">
               <a:rPr lang="cs-CZ" smtClean="0"/>
-              <a:t>07.05.2018</a:t>
+              <a:t>09.05.2018</a:t>
             </a:fld>
             <a:endParaRPr lang="cs-CZ"/>
           </a:p>
@@ -2112,7 +2113,7 @@
           <a:p>
             <a:fld id="{AC71B652-1057-46F3-ADB0-02ADCA82FBFB}" type="datetimeFigureOut">
               <a:rPr lang="cs-CZ" smtClean="0"/>
-              <a:t>07.05.2018</a:t>
+              <a:t>09.05.2018</a:t>
             </a:fld>
             <a:endParaRPr lang="cs-CZ"/>
           </a:p>
@@ -2369,7 +2370,7 @@
           <a:p>
             <a:fld id="{AC71B652-1057-46F3-ADB0-02ADCA82FBFB}" type="datetimeFigureOut">
               <a:rPr lang="cs-CZ" smtClean="0"/>
-              <a:t>07.05.2018</a:t>
+              <a:t>09.05.2018</a:t>
             </a:fld>
             <a:endParaRPr lang="cs-CZ"/>
           </a:p>
@@ -2582,7 +2583,7 @@
           <a:p>
             <a:fld id="{AC71B652-1057-46F3-ADB0-02ADCA82FBFB}" type="datetimeFigureOut">
               <a:rPr lang="cs-CZ" smtClean="0"/>
-              <a:t>07.05.2018</a:t>
+              <a:t>09.05.2018</a:t>
             </a:fld>
             <a:endParaRPr lang="cs-CZ"/>
           </a:p>
@@ -3537,6 +3538,148 @@
           <p:cNvPr id="2" name="Nadpis 1">
             <a:extLst>
               <a:ext uri="{FF2B5EF4-FFF2-40B4-BE49-F238E27FC236}">
+                <a16:creationId xmlns:a16="http://schemas.microsoft.com/office/drawing/2014/main" id="{85509428-56C9-43E9-833A-F581FB16D53D}"/>
+              </a:ext>
+            </a:extLst>
+          </p:cNvPr>
+          <p:cNvSpPr>
+            <a:spLocks noGrp="1"/>
+          </p:cNvSpPr>
+          <p:nvPr>
+            <p:ph type="title"/>
+          </p:nvPr>
+        </p:nvSpPr>
+        <p:spPr/>
+        <p:txBody>
+          <a:bodyPr/>
+          <a:lstStyle/>
+          <a:p>
+            <a:r>
+              <a:rPr lang="cs-CZ" dirty="0"/>
+              <a:t>Závěr</a:t>
+            </a:r>
+          </a:p>
+        </p:txBody>
+      </p:sp>
+      <p:sp>
+        <p:nvSpPr>
+          <p:cNvPr id="3" name="Zástupný symbol pro obsah 2">
+            <a:extLst>
+              <a:ext uri="{FF2B5EF4-FFF2-40B4-BE49-F238E27FC236}">
+                <a16:creationId xmlns:a16="http://schemas.microsoft.com/office/drawing/2014/main" id="{CC917A15-CCA1-44AD-8605-F5F5BD8F73CF}"/>
+              </a:ext>
+            </a:extLst>
+          </p:cNvPr>
+          <p:cNvSpPr>
+            <a:spLocks noGrp="1"/>
+          </p:cNvSpPr>
+          <p:nvPr>
+            <p:ph idx="1"/>
+          </p:nvPr>
+        </p:nvSpPr>
+        <p:spPr/>
+        <p:txBody>
+          <a:bodyPr/>
+          <a:lstStyle/>
+          <a:p>
+            <a:pPr>
+              <a:lnSpc>
+                <a:spcPct val="150000"/>
+              </a:lnSpc>
+            </a:pPr>
+            <a:r>
+              <a:rPr lang="cs-CZ" dirty="0"/>
+              <a:t>Splnění všech požadavků, úspěšné akceptační testování</a:t>
+            </a:r>
+          </a:p>
+          <a:p>
+            <a:pPr>
+              <a:lnSpc>
+                <a:spcPct val="150000"/>
+              </a:lnSpc>
+            </a:pPr>
+            <a:r>
+              <a:rPr lang="cs-CZ" dirty="0"/>
+              <a:t>Rozšíření znalostí</a:t>
+            </a:r>
+          </a:p>
+          <a:p>
+            <a:pPr marL="457200" lvl="1" indent="0">
+              <a:lnSpc>
+                <a:spcPct val="150000"/>
+              </a:lnSpc>
+              <a:buNone/>
+            </a:pPr>
+            <a:r>
+              <a:rPr lang="cs-CZ" dirty="0">
+                <a:sym typeface="Wingdings" panose="05000000000000000000" pitchFamily="2" charset="2"/>
+              </a:rPr>
+              <a:t> v</a:t>
+            </a:r>
+            <a:r>
+              <a:rPr lang="cs-CZ" dirty="0"/>
+              <a:t>yřešeny problémy s propojením frameworků + API</a:t>
+            </a:r>
+          </a:p>
+          <a:p>
+            <a:pPr>
+              <a:lnSpc>
+                <a:spcPct val="150000"/>
+              </a:lnSpc>
+            </a:pPr>
+            <a:r>
+              <a:rPr lang="cs-CZ" b="1" dirty="0"/>
+              <a:t>Aplikace nasazena a denně používána</a:t>
+            </a:r>
+          </a:p>
+          <a:p>
+            <a:pPr>
+              <a:lnSpc>
+                <a:spcPct val="150000"/>
+              </a:lnSpc>
+            </a:pPr>
+            <a:r>
+              <a:rPr lang="cs-CZ" dirty="0"/>
+              <a:t>+ další rozšíření</a:t>
+            </a:r>
+          </a:p>
+        </p:txBody>
+      </p:sp>
+    </p:spTree>
+    <p:extLst>
+      <p:ext uri="{BB962C8B-B14F-4D97-AF65-F5344CB8AC3E}">
+        <p14:creationId xmlns:p14="http://schemas.microsoft.com/office/powerpoint/2010/main" val="2704487588"/>
+      </p:ext>
+    </p:extLst>
+  </p:cSld>
+  <p:clrMapOvr>
+    <a:masterClrMapping/>
+  </p:clrMapOvr>
+</p:sld>
+</file>
+
+<file path=ppt/slides/slide11.xml><?xml version="1.0" encoding="utf-8"?>
+<p:sld xmlns:a="http://schemas.openxmlformats.org/drawingml/2006/main" xmlns:r="http://schemas.openxmlformats.org/officeDocument/2006/relationships" xmlns:p="http://schemas.openxmlformats.org/presentationml/2006/main">
+  <p:cSld>
+    <p:spTree>
+      <p:nvGrpSpPr>
+        <p:cNvPr id="1" name=""/>
+        <p:cNvGrpSpPr/>
+        <p:nvPr/>
+      </p:nvGrpSpPr>
+      <p:grpSpPr>
+        <a:xfrm>
+          <a:off x="0" y="0"/>
+          <a:ext cx="0" cy="0"/>
+          <a:chOff x="0" y="0"/>
+          <a:chExt cx="0" cy="0"/>
+        </a:xfrm>
+      </p:grpSpPr>
+      <p:sp>
+        <p:nvSpPr>
+          <p:cNvPr id="2" name="Nadpis 1">
+            <a:extLst>
+              <a:ext uri="{FF2B5EF4-FFF2-40B4-BE49-F238E27FC236}">
                 <a16:creationId xmlns:a16="http://schemas.microsoft.com/office/drawing/2014/main" id="{018A0051-F89C-4093-9E57-42F13EFE672D}"/>
               </a:ext>
             </a:extLst>
@@ -3761,7 +3904,7 @@
 </p:sld>
 </file>
 
-<file path=ppt/slides/slide11.xml><?xml version="1.0" encoding="utf-8"?>
+<file path=ppt/slides/slide12.xml><?xml version="1.0" encoding="utf-8"?>
 <p:sld xmlns:a="http://schemas.openxmlformats.org/drawingml/2006/main" xmlns:r="http://schemas.openxmlformats.org/officeDocument/2006/relationships" xmlns:p="http://schemas.openxmlformats.org/presentationml/2006/main">
   <p:cSld>
     <p:spTree>
@@ -4178,7 +4321,7 @@
           <p:cNvPr id="2" name="Nadpis 1">
             <a:extLst>
               <a:ext uri="{FF2B5EF4-FFF2-40B4-BE49-F238E27FC236}">
-                <a16:creationId xmlns:a16="http://schemas.microsoft.com/office/drawing/2014/main" id="{7980346D-187C-4388-B388-CC9EE7B89B0A}"/>
+                <a16:creationId xmlns:a16="http://schemas.microsoft.com/office/drawing/2014/main" id="{3D961A6C-6FA3-4C5F-BAFC-4C298056EF68}"/>
               </a:ext>
             </a:extLst>
           </p:cNvPr>
@@ -4195,10 +4338,9 @@
           <a:lstStyle/>
           <a:p>
             <a:r>
-              <a:rPr lang="cs-CZ"/>
-              <a:t>Požadavky</a:t>
-            </a:r>
-            <a:endParaRPr lang="cs-CZ" dirty="0"/>
+              <a:rPr lang="cs-CZ" dirty="0"/>
+              <a:t>Motivace</a:t>
+            </a:r>
           </a:p>
         </p:txBody>
       </p:sp>
@@ -4207,7 +4349,7 @@
           <p:cNvPr id="3" name="Zástupný symbol pro obsah 2">
             <a:extLst>
               <a:ext uri="{FF2B5EF4-FFF2-40B4-BE49-F238E27FC236}">
-                <a16:creationId xmlns:a16="http://schemas.microsoft.com/office/drawing/2014/main" id="{5D945C5D-07FC-4AF2-BBD0-ADE79FD936AF}"/>
+                <a16:creationId xmlns:a16="http://schemas.microsoft.com/office/drawing/2014/main" id="{0F1FA665-3C77-42D6-9940-B2D180A387E8}"/>
               </a:ext>
             </a:extLst>
           </p:cNvPr>
@@ -4220,9 +4362,7 @@
         </p:nvSpPr>
         <p:spPr/>
         <p:txBody>
-          <a:bodyPr>
-            <a:normAutofit lnSpcReduction="10000"/>
-          </a:bodyPr>
+          <a:bodyPr/>
           <a:lstStyle/>
           <a:p>
             <a:pPr>
@@ -4232,7 +4372,47 @@
             </a:pPr>
             <a:r>
               <a:rPr lang="cs-CZ" dirty="0"/>
-              <a:t>Responzivní webová aplikace</a:t>
+              <a:t>Podílení se na projektu už od počátku</a:t>
+            </a:r>
+          </a:p>
+          <a:p>
+            <a:pPr marL="457200" lvl="1" indent="0">
+              <a:lnSpc>
+                <a:spcPct val="150000"/>
+              </a:lnSpc>
+              <a:buNone/>
+            </a:pPr>
+            <a:r>
+              <a:rPr lang="en-US" dirty="0">
+                <a:sym typeface="Wingdings" panose="05000000000000000000" pitchFamily="2" charset="2"/>
+              </a:rPr>
+              <a:t> </a:t>
+            </a:r>
+            <a:r>
+              <a:rPr lang="cs-CZ" dirty="0">
+                <a:sym typeface="Wingdings" panose="05000000000000000000" pitchFamily="2" charset="2"/>
+              </a:rPr>
+              <a:t>technologie užitečným a podpůrným prvkem</a:t>
+            </a:r>
+          </a:p>
+          <a:p>
+            <a:pPr marL="457200" lvl="1" indent="0">
+              <a:lnSpc>
+                <a:spcPct val="150000"/>
+              </a:lnSpc>
+              <a:buNone/>
+            </a:pPr>
+            <a:r>
+              <a:rPr lang="en-US" dirty="0">
+                <a:sym typeface="Wingdings" panose="05000000000000000000" pitchFamily="2" charset="2"/>
+              </a:rPr>
+              <a:t> </a:t>
+            </a:r>
+            <a:r>
+              <a:rPr lang="cs-CZ" dirty="0">
+                <a:sym typeface="Wingdings" panose="05000000000000000000" pitchFamily="2" charset="2"/>
+              </a:rPr>
+              <a:t>usnadnění a ušetření času</a:t>
             </a:r>
           </a:p>
           <a:p>
@@ -4242,60 +4422,21 @@
               </a:lnSpc>
             </a:pPr>
             <a:r>
-              <a:rPr lang="cs-CZ" dirty="0"/>
-              <a:t>Evidence klientů, lekcí, docházky, skupin, plateb a kurzů</a:t>
-            </a:r>
-          </a:p>
-          <a:p>
-            <a:pPr>
-              <a:lnSpc>
-                <a:spcPct val="150000"/>
-              </a:lnSpc>
-            </a:pPr>
-            <a:r>
-              <a:rPr lang="cs-CZ" dirty="0"/>
-              <a:t>Předplacené lekce</a:t>
-            </a:r>
-          </a:p>
-          <a:p>
-            <a:pPr>
-              <a:lnSpc>
-                <a:spcPct val="150000"/>
-              </a:lnSpc>
-            </a:pPr>
-            <a:r>
-              <a:rPr lang="cs-CZ" dirty="0"/>
-              <a:t>Zobrazení historie (den/týden)</a:t>
-            </a:r>
-          </a:p>
-          <a:p>
-            <a:pPr>
-              <a:lnSpc>
-                <a:spcPct val="150000"/>
-              </a:lnSpc>
-            </a:pPr>
-            <a:r>
-              <a:rPr lang="cs-CZ" dirty="0"/>
-              <a:t>Číslo lekce, upozornění na platbu příště</a:t>
-            </a:r>
-          </a:p>
-          <a:p>
-            <a:pPr>
-              <a:lnSpc>
-                <a:spcPct val="150000"/>
-              </a:lnSpc>
-            </a:pPr>
-            <a:r>
-              <a:rPr lang="cs-CZ" dirty="0"/>
-              <a:t>Bezpečnost, srozumitelné a jednoduché UI, rozšiřitelnost</a:t>
-            </a:r>
+              <a:rPr lang="cs-CZ" dirty="0">
+                <a:sym typeface="Wingdings" panose="05000000000000000000" pitchFamily="2" charset="2"/>
+              </a:rPr>
+              <a:t>Rozvoj znalostí a dovedností – nové technologie</a:t>
+            </a:r>
+            <a:endParaRPr lang="en-US" dirty="0">
+              <a:sym typeface="Wingdings" panose="05000000000000000000" pitchFamily="2" charset="2"/>
+            </a:endParaRPr>
           </a:p>
         </p:txBody>
       </p:sp>
     </p:spTree>
     <p:extLst>
       <p:ext uri="{BB962C8B-B14F-4D97-AF65-F5344CB8AC3E}">
-        <p14:creationId xmlns:p14="http://schemas.microsoft.com/office/powerpoint/2010/main" val="2700740852"/>
+        <p14:creationId xmlns:p14="http://schemas.microsoft.com/office/powerpoint/2010/main" val="1285143526"/>
       </p:ext>
     </p:extLst>
   </p:cSld>
@@ -4327,7 +4468,7 @@
           <p:cNvPr id="2" name="Nadpis 1">
             <a:extLst>
               <a:ext uri="{FF2B5EF4-FFF2-40B4-BE49-F238E27FC236}">
-                <a16:creationId xmlns:a16="http://schemas.microsoft.com/office/drawing/2014/main" id="{3D961A6C-6FA3-4C5F-BAFC-4C298056EF68}"/>
+                <a16:creationId xmlns:a16="http://schemas.microsoft.com/office/drawing/2014/main" id="{7980346D-187C-4388-B388-CC9EE7B89B0A}"/>
               </a:ext>
             </a:extLst>
           </p:cNvPr>
@@ -4344,9 +4485,10 @@
           <a:lstStyle/>
           <a:p>
             <a:r>
-              <a:rPr lang="cs-CZ" dirty="0"/>
-              <a:t>Motivace</a:t>
-            </a:r>
+              <a:rPr lang="cs-CZ"/>
+              <a:t>Požadavky</a:t>
+            </a:r>
+            <a:endParaRPr lang="cs-CZ" dirty="0"/>
           </a:p>
         </p:txBody>
       </p:sp>
@@ -4355,7 +4497,7 @@
           <p:cNvPr id="3" name="Zástupný symbol pro obsah 2">
             <a:extLst>
               <a:ext uri="{FF2B5EF4-FFF2-40B4-BE49-F238E27FC236}">
-                <a16:creationId xmlns:a16="http://schemas.microsoft.com/office/drawing/2014/main" id="{0F1FA665-3C77-42D6-9940-B2D180A387E8}"/>
+                <a16:creationId xmlns:a16="http://schemas.microsoft.com/office/drawing/2014/main" id="{5D945C5D-07FC-4AF2-BBD0-ADE79FD936AF}"/>
               </a:ext>
             </a:extLst>
           </p:cNvPr>
@@ -4368,7 +4510,9 @@
         </p:nvSpPr>
         <p:spPr/>
         <p:txBody>
-          <a:bodyPr/>
+          <a:bodyPr>
+            <a:normAutofit lnSpcReduction="10000"/>
+          </a:bodyPr>
           <a:lstStyle/>
           <a:p>
             <a:pPr>
@@ -4378,47 +4522,7 @@
             </a:pPr>
             <a:r>
               <a:rPr lang="cs-CZ" dirty="0"/>
-              <a:t>Podílení se na projektu už od počátku</a:t>
-            </a:r>
-          </a:p>
-          <a:p>
-            <a:pPr marL="457200" lvl="1" indent="0">
-              <a:lnSpc>
-                <a:spcPct val="150000"/>
-              </a:lnSpc>
-              <a:buNone/>
-            </a:pPr>
-            <a:r>
-              <a:rPr lang="en-US" dirty="0">
-                <a:sym typeface="Wingdings" panose="05000000000000000000" pitchFamily="2" charset="2"/>
-              </a:rPr>
-              <a:t> </a:t>
-            </a:r>
-            <a:r>
-              <a:rPr lang="cs-CZ" dirty="0">
-                <a:sym typeface="Wingdings" panose="05000000000000000000" pitchFamily="2" charset="2"/>
-              </a:rPr>
-              <a:t>technologie užitečným a podpůrným prvkem</a:t>
-            </a:r>
-          </a:p>
-          <a:p>
-            <a:pPr marL="457200" lvl="1" indent="0">
-              <a:lnSpc>
-                <a:spcPct val="150000"/>
-              </a:lnSpc>
-              <a:buNone/>
-            </a:pPr>
-            <a:r>
-              <a:rPr lang="en-US" dirty="0">
-                <a:sym typeface="Wingdings" panose="05000000000000000000" pitchFamily="2" charset="2"/>
-              </a:rPr>
-              <a:t> </a:t>
-            </a:r>
-            <a:r>
-              <a:rPr lang="cs-CZ" dirty="0">
-                <a:sym typeface="Wingdings" panose="05000000000000000000" pitchFamily="2" charset="2"/>
-              </a:rPr>
-              <a:t>usnadnění a ušetření času</a:t>
+              <a:t>Responzivní webová aplikace</a:t>
             </a:r>
           </a:p>
           <a:p>
@@ -4428,21 +4532,60 @@
               </a:lnSpc>
             </a:pPr>
             <a:r>
-              <a:rPr lang="cs-CZ" dirty="0">
-                <a:sym typeface="Wingdings" panose="05000000000000000000" pitchFamily="2" charset="2"/>
-              </a:rPr>
-              <a:t>Rozvoj znalostí a dovedností – nové technologie</a:t>
-            </a:r>
-            <a:endParaRPr lang="en-US" dirty="0">
-              <a:sym typeface="Wingdings" panose="05000000000000000000" pitchFamily="2" charset="2"/>
-            </a:endParaRPr>
+              <a:rPr lang="cs-CZ" dirty="0"/>
+              <a:t>Evidence klientů, lekcí, docházky, skupin, plateb a kurzů</a:t>
+            </a:r>
+          </a:p>
+          <a:p>
+            <a:pPr>
+              <a:lnSpc>
+                <a:spcPct val="150000"/>
+              </a:lnSpc>
+            </a:pPr>
+            <a:r>
+              <a:rPr lang="cs-CZ" dirty="0"/>
+              <a:t>Předplacené lekce</a:t>
+            </a:r>
+          </a:p>
+          <a:p>
+            <a:pPr>
+              <a:lnSpc>
+                <a:spcPct val="150000"/>
+              </a:lnSpc>
+            </a:pPr>
+            <a:r>
+              <a:rPr lang="cs-CZ" dirty="0"/>
+              <a:t>Zobrazení historie (den/týden)</a:t>
+            </a:r>
+          </a:p>
+          <a:p>
+            <a:pPr>
+              <a:lnSpc>
+                <a:spcPct val="150000"/>
+              </a:lnSpc>
+            </a:pPr>
+            <a:r>
+              <a:rPr lang="cs-CZ" dirty="0"/>
+              <a:t>Číslo lekce, upozornění na platbu příště</a:t>
+            </a:r>
+          </a:p>
+          <a:p>
+            <a:pPr>
+              <a:lnSpc>
+                <a:spcPct val="150000"/>
+              </a:lnSpc>
+            </a:pPr>
+            <a:r>
+              <a:rPr lang="cs-CZ" dirty="0"/>
+              <a:t>Bezpečnost, srozumitelné a jednoduché UI, rozšiřitelnost</a:t>
+            </a:r>
           </a:p>
         </p:txBody>
       </p:sp>
     </p:spTree>
     <p:extLst>
       <p:ext uri="{BB962C8B-B14F-4D97-AF65-F5344CB8AC3E}">
-        <p14:creationId xmlns:p14="http://schemas.microsoft.com/office/powerpoint/2010/main" val="1285143526"/>
+        <p14:creationId xmlns:p14="http://schemas.microsoft.com/office/powerpoint/2010/main" val="2700740852"/>
       </p:ext>
     </p:extLst>
   </p:cSld>
@@ -4607,7 +4750,13 @@
               <a:rPr lang="cs-CZ" dirty="0">
                 <a:sym typeface="Wingdings" panose="05000000000000000000" pitchFamily="2" charset="2"/>
               </a:rPr>
-              <a:t> a Node.js</a:t>
+              <a:t> </a:t>
+            </a:r>
+            <a:r>
+              <a:rPr lang="cs-CZ" i="1" dirty="0">
+                <a:sym typeface="Wingdings" panose="05000000000000000000" pitchFamily="2" charset="2"/>
+              </a:rPr>
+              <a:t>a Node.js</a:t>
             </a:r>
             <a:r>
               <a:rPr lang="en-US" dirty="0">
@@ -4996,115 +5145,46 @@
           <a:chExt cx="0" cy="0"/>
         </a:xfrm>
       </p:grpSpPr>
-      <p:sp>
-        <p:nvSpPr>
-          <p:cNvPr id="2" name="Nadpis 1">
+      <p:pic>
+        <p:nvPicPr>
+          <p:cNvPr id="3" name="Obrázek 2">
             <a:extLst>
               <a:ext uri="{FF2B5EF4-FFF2-40B4-BE49-F238E27FC236}">
-                <a16:creationId xmlns:a16="http://schemas.microsoft.com/office/drawing/2014/main" id="{85509428-56C9-43E9-833A-F581FB16D53D}"/>
+                <a16:creationId xmlns:a16="http://schemas.microsoft.com/office/drawing/2014/main" id="{4DE0D633-D66B-4CF1-90F4-78D42F24AF1A}"/>
               </a:ext>
             </a:extLst>
           </p:cNvPr>
-          <p:cNvSpPr>
-            <a:spLocks noGrp="1"/>
-          </p:cNvSpPr>
-          <p:nvPr>
-            <p:ph type="title"/>
-          </p:nvPr>
-        </p:nvSpPr>
-        <p:spPr/>
-        <p:txBody>
-          <a:bodyPr/>
-          <a:lstStyle/>
-          <a:p>
-            <a:r>
-              <a:rPr lang="cs-CZ" dirty="0"/>
-              <a:t>Závěr</a:t>
-            </a:r>
-          </a:p>
-        </p:txBody>
-      </p:sp>
-      <p:sp>
-        <p:nvSpPr>
-          <p:cNvPr id="3" name="Zástupný symbol pro obsah 2">
+          <p:cNvPicPr>
+            <a:picLocks noChangeAspect="1"/>
+          </p:cNvPicPr>
+          <p:nvPr/>
+        </p:nvPicPr>
+        <p:blipFill>
+          <a:blip r:embed="rId2">
             <a:extLst>
-              <a:ext uri="{FF2B5EF4-FFF2-40B4-BE49-F238E27FC236}">
-                <a16:creationId xmlns:a16="http://schemas.microsoft.com/office/drawing/2014/main" id="{CC917A15-CCA1-44AD-8605-F5F5BD8F73CF}"/>
+              <a:ext uri="{28A0092B-C50C-407E-A947-70E740481C1C}">
+                <a14:useLocalDpi xmlns:a14="http://schemas.microsoft.com/office/drawing/2010/main" val="0"/>
               </a:ext>
             </a:extLst>
-          </p:cNvPr>
-          <p:cNvSpPr>
-            <a:spLocks noGrp="1"/>
-          </p:cNvSpPr>
-          <p:nvPr>
-            <p:ph idx="1"/>
-          </p:nvPr>
-        </p:nvSpPr>
-        <p:spPr/>
-        <p:txBody>
-          <a:bodyPr/>
-          <a:lstStyle/>
-          <a:p>
-            <a:pPr>
-              <a:lnSpc>
-                <a:spcPct val="150000"/>
-              </a:lnSpc>
-            </a:pPr>
-            <a:r>
-              <a:rPr lang="cs-CZ" dirty="0"/>
-              <a:t>Splnění všech požadavků</a:t>
-            </a:r>
-          </a:p>
-          <a:p>
-            <a:pPr>
-              <a:lnSpc>
-                <a:spcPct val="150000"/>
-              </a:lnSpc>
-            </a:pPr>
-            <a:r>
-              <a:rPr lang="cs-CZ" dirty="0"/>
-              <a:t>Úspěšné akceptační testování</a:t>
-            </a:r>
-          </a:p>
-          <a:p>
-            <a:pPr>
-              <a:lnSpc>
-                <a:spcPct val="150000"/>
-              </a:lnSpc>
-            </a:pPr>
-            <a:r>
-              <a:rPr lang="cs-CZ" dirty="0"/>
-              <a:t>Vyřešeny problémy s propojením frameworků + API</a:t>
-            </a:r>
-          </a:p>
-          <a:p>
-            <a:pPr>
-              <a:lnSpc>
-                <a:spcPct val="150000"/>
-              </a:lnSpc>
-            </a:pPr>
-            <a:r>
-              <a:rPr lang="cs-CZ" dirty="0"/>
-              <a:t>Aplikace nasazena a denně používána</a:t>
-            </a:r>
-          </a:p>
-          <a:p>
-            <a:pPr>
-              <a:lnSpc>
-                <a:spcPct val="150000"/>
-              </a:lnSpc>
-            </a:pPr>
-            <a:r>
-              <a:rPr lang="cs-CZ" dirty="0"/>
-              <a:t>+ další rozšíření</a:t>
-            </a:r>
-          </a:p>
-        </p:txBody>
-      </p:sp>
+          </a:blip>
+          <a:stretch>
+            <a:fillRect/>
+          </a:stretch>
+        </p:blipFill>
+        <p:spPr>
+          <a:xfrm>
+            <a:off x="2124437" y="0"/>
+            <a:ext cx="7943126" cy="6858000"/>
+          </a:xfrm>
+          <a:prstGeom prst="rect">
+            <a:avLst/>
+          </a:prstGeom>
+        </p:spPr>
+      </p:pic>
     </p:spTree>
     <p:extLst>
       <p:ext uri="{BB962C8B-B14F-4D97-AF65-F5344CB8AC3E}">
-        <p14:creationId xmlns:p14="http://schemas.microsoft.com/office/powerpoint/2010/main" val="2704487588"/>
+        <p14:creationId xmlns:p14="http://schemas.microsoft.com/office/powerpoint/2010/main" val="4072932921"/>
       </p:ext>
     </p:extLst>
   </p:cSld>

</xml_diff>

<commit_message>
drobné úpravy prezentace, vytvoření PDF
- drobné úpravy prezentace na základě několika vyzkoušení samotného prezentování
- PDF soubor s prezentací
</commit_message>
<xml_diff>
--- a/prezentace/DPR prezentace.pptx
+++ b/prezentace/DPR prezentace.pptx
@@ -258,7 +258,7 @@
           <a:p>
             <a:fld id="{AC71B652-1057-46F3-ADB0-02ADCA82FBFB}" type="datetimeFigureOut">
               <a:rPr lang="cs-CZ" smtClean="0"/>
-              <a:t>10.05.2018</a:t>
+              <a:t>12.05.2018</a:t>
             </a:fld>
             <a:endParaRPr lang="cs-CZ"/>
           </a:p>
@@ -428,7 +428,7 @@
           <a:p>
             <a:fld id="{AC71B652-1057-46F3-ADB0-02ADCA82FBFB}" type="datetimeFigureOut">
               <a:rPr lang="cs-CZ" smtClean="0"/>
-              <a:t>10.05.2018</a:t>
+              <a:t>12.05.2018</a:t>
             </a:fld>
             <a:endParaRPr lang="cs-CZ"/>
           </a:p>
@@ -608,7 +608,7 @@
           <a:p>
             <a:fld id="{AC71B652-1057-46F3-ADB0-02ADCA82FBFB}" type="datetimeFigureOut">
               <a:rPr lang="cs-CZ" smtClean="0"/>
-              <a:t>10.05.2018</a:t>
+              <a:t>12.05.2018</a:t>
             </a:fld>
             <a:endParaRPr lang="cs-CZ"/>
           </a:p>
@@ -778,7 +778,7 @@
           <a:p>
             <a:fld id="{AC71B652-1057-46F3-ADB0-02ADCA82FBFB}" type="datetimeFigureOut">
               <a:rPr lang="cs-CZ" smtClean="0"/>
-              <a:t>10.05.2018</a:t>
+              <a:t>12.05.2018</a:t>
             </a:fld>
             <a:endParaRPr lang="cs-CZ"/>
           </a:p>
@@ -1024,7 +1024,7 @@
           <a:p>
             <a:fld id="{AC71B652-1057-46F3-ADB0-02ADCA82FBFB}" type="datetimeFigureOut">
               <a:rPr lang="cs-CZ" smtClean="0"/>
-              <a:t>10.05.2018</a:t>
+              <a:t>12.05.2018</a:t>
             </a:fld>
             <a:endParaRPr lang="cs-CZ"/>
           </a:p>
@@ -1256,7 +1256,7 @@
           <a:p>
             <a:fld id="{AC71B652-1057-46F3-ADB0-02ADCA82FBFB}" type="datetimeFigureOut">
               <a:rPr lang="cs-CZ" smtClean="0"/>
-              <a:t>10.05.2018</a:t>
+              <a:t>12.05.2018</a:t>
             </a:fld>
             <a:endParaRPr lang="cs-CZ"/>
           </a:p>
@@ -1623,7 +1623,7 @@
           <a:p>
             <a:fld id="{AC71B652-1057-46F3-ADB0-02ADCA82FBFB}" type="datetimeFigureOut">
               <a:rPr lang="cs-CZ" smtClean="0"/>
-              <a:t>10.05.2018</a:t>
+              <a:t>12.05.2018</a:t>
             </a:fld>
             <a:endParaRPr lang="cs-CZ"/>
           </a:p>
@@ -1741,7 +1741,7 @@
           <a:p>
             <a:fld id="{AC71B652-1057-46F3-ADB0-02ADCA82FBFB}" type="datetimeFigureOut">
               <a:rPr lang="cs-CZ" smtClean="0"/>
-              <a:t>10.05.2018</a:t>
+              <a:t>12.05.2018</a:t>
             </a:fld>
             <a:endParaRPr lang="cs-CZ"/>
           </a:p>
@@ -1836,7 +1836,7 @@
           <a:p>
             <a:fld id="{AC71B652-1057-46F3-ADB0-02ADCA82FBFB}" type="datetimeFigureOut">
               <a:rPr lang="cs-CZ" smtClean="0"/>
-              <a:t>10.05.2018</a:t>
+              <a:t>12.05.2018</a:t>
             </a:fld>
             <a:endParaRPr lang="cs-CZ"/>
           </a:p>
@@ -2113,7 +2113,7 @@
           <a:p>
             <a:fld id="{AC71B652-1057-46F3-ADB0-02ADCA82FBFB}" type="datetimeFigureOut">
               <a:rPr lang="cs-CZ" smtClean="0"/>
-              <a:t>10.05.2018</a:t>
+              <a:t>12.05.2018</a:t>
             </a:fld>
             <a:endParaRPr lang="cs-CZ"/>
           </a:p>
@@ -2370,7 +2370,7 @@
           <a:p>
             <a:fld id="{AC71B652-1057-46F3-ADB0-02ADCA82FBFB}" type="datetimeFigureOut">
               <a:rPr lang="cs-CZ" smtClean="0"/>
-              <a:t>10.05.2018</a:t>
+              <a:t>12.05.2018</a:t>
             </a:fld>
             <a:endParaRPr lang="cs-CZ"/>
           </a:p>
@@ -2583,7 +2583,7 @@
           <a:p>
             <a:fld id="{AC71B652-1057-46F3-ADB0-02ADCA82FBFB}" type="datetimeFigureOut">
               <a:rPr lang="cs-CZ" smtClean="0"/>
-              <a:t>10.05.2018</a:t>
+              <a:t>12.05.2018</a:t>
             </a:fld>
             <a:endParaRPr lang="cs-CZ"/>
           </a:p>
@@ -4372,7 +4372,7 @@
             </a:pPr>
             <a:r>
               <a:rPr lang="cs-CZ" dirty="0"/>
-              <a:t>Podílení se na projektu už od počátku</a:t>
+              <a:t>Podílím se na projektu už od počátku</a:t>
             </a:r>
           </a:p>
           <a:p>
@@ -4485,10 +4485,9 @@
           <a:lstStyle/>
           <a:p>
             <a:r>
-              <a:rPr lang="cs-CZ"/>
+              <a:rPr lang="cs-CZ" dirty="0"/>
               <a:t>Požadavky</a:t>
             </a:r>
-            <a:endParaRPr lang="cs-CZ" dirty="0"/>
           </a:p>
         </p:txBody>
       </p:sp>
@@ -4533,73 +4532,7 @@
             </a:pPr>
             <a:r>
               <a:rPr lang="cs-CZ" dirty="0"/>
-              <a:t>Evidence klientů, lekcí, docházky, skupin, plateb a kurzů</a:t>
-            </a:r>
-          </a:p>
-          <a:p>
-            <a:pPr marL="457200" lvl="1" indent="0">
-              <a:lnSpc>
-                <a:spcPct val="150000"/>
-              </a:lnSpc>
-              <a:buNone/>
-            </a:pPr>
-            <a:r>
-              <a:rPr lang="en-US" dirty="0">
-                <a:sym typeface="Wingdings" panose="05000000000000000000" pitchFamily="2" charset="2"/>
-              </a:rPr>
-              <a:t> </a:t>
-            </a:r>
-            <a:r>
-              <a:rPr lang="cs-CZ" dirty="0">
-                <a:sym typeface="Wingdings" panose="05000000000000000000" pitchFamily="2" charset="2"/>
-              </a:rPr>
-              <a:t>P</a:t>
-            </a:r>
-            <a:r>
-              <a:rPr lang="cs-CZ" dirty="0"/>
-              <a:t>ředplacené lekce</a:t>
-            </a:r>
-          </a:p>
-          <a:p>
-            <a:pPr marL="457200" lvl="1" indent="0">
-              <a:lnSpc>
-                <a:spcPct val="150000"/>
-              </a:lnSpc>
-              <a:buNone/>
-            </a:pPr>
-            <a:r>
-              <a:rPr lang="en-US" dirty="0">
-                <a:sym typeface="Wingdings" panose="05000000000000000000" pitchFamily="2" charset="2"/>
-              </a:rPr>
-              <a:t> </a:t>
-            </a:r>
-            <a:r>
-              <a:rPr lang="cs-CZ" dirty="0">
-                <a:sym typeface="Wingdings" panose="05000000000000000000" pitchFamily="2" charset="2"/>
-              </a:rPr>
-              <a:t>Z</a:t>
-            </a:r>
-            <a:r>
-              <a:rPr lang="cs-CZ" dirty="0"/>
-              <a:t>obrazení historie (den/týden)</a:t>
-            </a:r>
-          </a:p>
-          <a:p>
-            <a:pPr marL="457200" lvl="1" indent="0">
-              <a:lnSpc>
-                <a:spcPct val="150000"/>
-              </a:lnSpc>
-              <a:buNone/>
-            </a:pPr>
-            <a:r>
-              <a:rPr lang="en-US" dirty="0">
-                <a:sym typeface="Wingdings" panose="05000000000000000000" pitchFamily="2" charset="2"/>
-              </a:rPr>
-              <a:t> </a:t>
-            </a:r>
-            <a:r>
-              <a:rPr lang="cs-CZ" dirty="0"/>
-              <a:t>Číslo lekce, upozornění na platbu příště</a:t>
+              <a:t>Bezpečnost, srozumitelné a jednoduché UI, rozšiřitelnost</a:t>
             </a:r>
           </a:p>
           <a:p>
@@ -4610,8 +4543,82 @@
             </a:pPr>
             <a:r>
               <a:rPr lang="cs-CZ" dirty="0"/>
-              <a:t>Bezpečnost, srozumitelné a jednoduché UI, rozšiřitelnost</a:t>
-            </a:r>
+              <a:t>Evidence klientů, lekcí, docházky, skupin, plateb a kurzů</a:t>
+            </a:r>
+          </a:p>
+          <a:p>
+            <a:pPr marL="457200" lvl="1" indent="0">
+              <a:lnSpc>
+                <a:spcPct val="150000"/>
+              </a:lnSpc>
+              <a:buNone/>
+            </a:pPr>
+            <a:r>
+              <a:rPr lang="en-US" dirty="0">
+                <a:sym typeface="Wingdings" panose="05000000000000000000" pitchFamily="2" charset="2"/>
+              </a:rPr>
+              <a:t> </a:t>
+            </a:r>
+            <a:r>
+              <a:rPr lang="cs-CZ" dirty="0">
+                <a:sym typeface="Wingdings" panose="05000000000000000000" pitchFamily="2" charset="2"/>
+              </a:rPr>
+              <a:t>P</a:t>
+            </a:r>
+            <a:r>
+              <a:rPr lang="cs-CZ" dirty="0"/>
+              <a:t>ředplacené lekce</a:t>
+            </a:r>
+          </a:p>
+          <a:p>
+            <a:pPr marL="457200" lvl="1" indent="0">
+              <a:lnSpc>
+                <a:spcPct val="150000"/>
+              </a:lnSpc>
+              <a:buNone/>
+            </a:pPr>
+            <a:r>
+              <a:rPr lang="en-US" dirty="0">
+                <a:sym typeface="Wingdings" panose="05000000000000000000" pitchFamily="2" charset="2"/>
+              </a:rPr>
+              <a:t> </a:t>
+            </a:r>
+            <a:r>
+              <a:rPr lang="cs-CZ" dirty="0">
+                <a:sym typeface="Wingdings" panose="05000000000000000000" pitchFamily="2" charset="2"/>
+              </a:rPr>
+              <a:t>Z</a:t>
+            </a:r>
+            <a:r>
+              <a:rPr lang="cs-CZ" dirty="0"/>
+              <a:t>obrazení den/týden</a:t>
+            </a:r>
+          </a:p>
+          <a:p>
+            <a:pPr marL="457200" lvl="1" indent="0">
+              <a:lnSpc>
+                <a:spcPct val="150000"/>
+              </a:lnSpc>
+              <a:buNone/>
+            </a:pPr>
+            <a:r>
+              <a:rPr lang="en-US" dirty="0">
+                <a:sym typeface="Wingdings" panose="05000000000000000000" pitchFamily="2" charset="2"/>
+              </a:rPr>
+              <a:t> </a:t>
+            </a:r>
+            <a:r>
+              <a:rPr lang="cs-CZ" dirty="0"/>
+              <a:t>Číslo lekce, upozornění na platbu příště</a:t>
+            </a:r>
+          </a:p>
+          <a:p>
+            <a:pPr>
+              <a:lnSpc>
+                <a:spcPct val="150000"/>
+              </a:lnSpc>
+            </a:pPr>
+            <a:endParaRPr lang="cs-CZ" dirty="0"/>
           </a:p>
         </p:txBody>
       </p:sp>

</xml_diff>

<commit_message>
úprava pořadí řádků v závěru prezentace
</commit_message>
<xml_diff>
--- a/prezentace/DPR prezentace.pptx
+++ b/prezentace/DPR prezentace.pptx
@@ -258,7 +258,7 @@
           <a:p>
             <a:fld id="{AC71B652-1057-46F3-ADB0-02ADCA82FBFB}" type="datetimeFigureOut">
               <a:rPr lang="cs-CZ" smtClean="0"/>
-              <a:t>12.05.2018</a:t>
+              <a:t>13.05.2018</a:t>
             </a:fld>
             <a:endParaRPr lang="cs-CZ"/>
           </a:p>
@@ -428,7 +428,7 @@
           <a:p>
             <a:fld id="{AC71B652-1057-46F3-ADB0-02ADCA82FBFB}" type="datetimeFigureOut">
               <a:rPr lang="cs-CZ" smtClean="0"/>
-              <a:t>12.05.2018</a:t>
+              <a:t>13.05.2018</a:t>
             </a:fld>
             <a:endParaRPr lang="cs-CZ"/>
           </a:p>
@@ -608,7 +608,7 @@
           <a:p>
             <a:fld id="{AC71B652-1057-46F3-ADB0-02ADCA82FBFB}" type="datetimeFigureOut">
               <a:rPr lang="cs-CZ" smtClean="0"/>
-              <a:t>12.05.2018</a:t>
+              <a:t>13.05.2018</a:t>
             </a:fld>
             <a:endParaRPr lang="cs-CZ"/>
           </a:p>
@@ -778,7 +778,7 @@
           <a:p>
             <a:fld id="{AC71B652-1057-46F3-ADB0-02ADCA82FBFB}" type="datetimeFigureOut">
               <a:rPr lang="cs-CZ" smtClean="0"/>
-              <a:t>12.05.2018</a:t>
+              <a:t>13.05.2018</a:t>
             </a:fld>
             <a:endParaRPr lang="cs-CZ"/>
           </a:p>
@@ -1024,7 +1024,7 @@
           <a:p>
             <a:fld id="{AC71B652-1057-46F3-ADB0-02ADCA82FBFB}" type="datetimeFigureOut">
               <a:rPr lang="cs-CZ" smtClean="0"/>
-              <a:t>12.05.2018</a:t>
+              <a:t>13.05.2018</a:t>
             </a:fld>
             <a:endParaRPr lang="cs-CZ"/>
           </a:p>
@@ -1256,7 +1256,7 @@
           <a:p>
             <a:fld id="{AC71B652-1057-46F3-ADB0-02ADCA82FBFB}" type="datetimeFigureOut">
               <a:rPr lang="cs-CZ" smtClean="0"/>
-              <a:t>12.05.2018</a:t>
+              <a:t>13.05.2018</a:t>
             </a:fld>
             <a:endParaRPr lang="cs-CZ"/>
           </a:p>
@@ -1623,7 +1623,7 @@
           <a:p>
             <a:fld id="{AC71B652-1057-46F3-ADB0-02ADCA82FBFB}" type="datetimeFigureOut">
               <a:rPr lang="cs-CZ" smtClean="0"/>
-              <a:t>12.05.2018</a:t>
+              <a:t>13.05.2018</a:t>
             </a:fld>
             <a:endParaRPr lang="cs-CZ"/>
           </a:p>
@@ -1741,7 +1741,7 @@
           <a:p>
             <a:fld id="{AC71B652-1057-46F3-ADB0-02ADCA82FBFB}" type="datetimeFigureOut">
               <a:rPr lang="cs-CZ" smtClean="0"/>
-              <a:t>12.05.2018</a:t>
+              <a:t>13.05.2018</a:t>
             </a:fld>
             <a:endParaRPr lang="cs-CZ"/>
           </a:p>
@@ -1836,7 +1836,7 @@
           <a:p>
             <a:fld id="{AC71B652-1057-46F3-ADB0-02ADCA82FBFB}" type="datetimeFigureOut">
               <a:rPr lang="cs-CZ" smtClean="0"/>
-              <a:t>12.05.2018</a:t>
+              <a:t>13.05.2018</a:t>
             </a:fld>
             <a:endParaRPr lang="cs-CZ"/>
           </a:p>
@@ -2113,7 +2113,7 @@
           <a:p>
             <a:fld id="{AC71B652-1057-46F3-ADB0-02ADCA82FBFB}" type="datetimeFigureOut">
               <a:rPr lang="cs-CZ" smtClean="0"/>
-              <a:t>12.05.2018</a:t>
+              <a:t>13.05.2018</a:t>
             </a:fld>
             <a:endParaRPr lang="cs-CZ"/>
           </a:p>
@@ -2370,7 +2370,7 @@
           <a:p>
             <a:fld id="{AC71B652-1057-46F3-ADB0-02ADCA82FBFB}" type="datetimeFigureOut">
               <a:rPr lang="cs-CZ" smtClean="0"/>
-              <a:t>12.05.2018</a:t>
+              <a:t>13.05.2018</a:t>
             </a:fld>
             <a:endParaRPr lang="cs-CZ"/>
           </a:p>
@@ -2583,7 +2583,7 @@
           <a:p>
             <a:fld id="{AC71B652-1057-46F3-ADB0-02ADCA82FBFB}" type="datetimeFigureOut">
               <a:rPr lang="cs-CZ" smtClean="0"/>
-              <a:t>12.05.2018</a:t>
+              <a:t>13.05.2018</a:t>
             </a:fld>
             <a:endParaRPr lang="cs-CZ"/>
           </a:p>
@@ -3591,6 +3591,7 @@
               <a:rPr lang="cs-CZ" dirty="0"/>
               <a:t>Splnění všech požadavků, úspěšné akceptační testování</a:t>
             </a:r>
+            <a:endParaRPr lang="cs-CZ" b="1" dirty="0"/>
           </a:p>
           <a:p>
             <a:pPr>
@@ -3599,27 +3600,10 @@
               </a:lnSpc>
             </a:pPr>
             <a:r>
-              <a:rPr lang="cs-CZ" dirty="0"/>
-              <a:t>Rozšíření znalostí</a:t>
-            </a:r>
-          </a:p>
-          <a:p>
-            <a:pPr marL="457200" lvl="1" indent="0">
-              <a:lnSpc>
-                <a:spcPct val="150000"/>
-              </a:lnSpc>
-              <a:buNone/>
-            </a:pPr>
-            <a:r>
-              <a:rPr lang="cs-CZ" dirty="0">
-                <a:sym typeface="Wingdings" panose="05000000000000000000" pitchFamily="2" charset="2"/>
-              </a:rPr>
-              <a:t> V</a:t>
-            </a:r>
-            <a:r>
-              <a:rPr lang="cs-CZ" dirty="0"/>
-              <a:t>yřešení problémů s propojením frameworků + API</a:t>
-            </a:r>
+              <a:rPr lang="cs-CZ" b="1" dirty="0"/>
+              <a:t>Aplikace nasazena a denně používána</a:t>
+            </a:r>
+            <a:endParaRPr lang="cs-CZ" dirty="0"/>
           </a:p>
           <a:p>
             <a:pPr>
@@ -3628,19 +3612,26 @@
               </a:lnSpc>
             </a:pPr>
             <a:r>
-              <a:rPr lang="cs-CZ" b="1" dirty="0"/>
-              <a:t>Aplikace nasazena a denně používána</a:t>
-            </a:r>
-          </a:p>
-          <a:p>
-            <a:pPr>
+              <a:rPr lang="cs-CZ" dirty="0"/>
+              <a:t>Rozšíření znalostí</a:t>
+            </a:r>
+          </a:p>
+          <a:p>
+            <a:pPr marL="457200" lvl="1" indent="0">
               <a:lnSpc>
                 <a:spcPct val="150000"/>
               </a:lnSpc>
+              <a:buNone/>
             </a:pPr>
             <a:r>
+              <a:rPr lang="cs-CZ" dirty="0">
+                <a:sym typeface="Wingdings" panose="05000000000000000000" pitchFamily="2" charset="2"/>
+              </a:rPr>
+              <a:t> V</a:t>
+            </a:r>
+            <a:r>
               <a:rPr lang="cs-CZ" dirty="0"/>
-              <a:t>+ další rozšíření</a:t>
+              <a:t>yřešení problémů s propojením frameworků + API+ další rozšíření</a:t>
             </a:r>
           </a:p>
         </p:txBody>

</xml_diff>

<commit_message>
vylepšení prezentace na základě jejím předvedení v rámci předmětu DPR
</commit_message>
<xml_diff>
--- a/prezentace/DPR prezentace.pptx
+++ b/prezentace/DPR prezentace.pptx
@@ -3626,16 +3626,15 @@
               <a:buNone/>
             </a:pPr>
             <a:r>
-              <a:rPr lang="cs-CZ">
+              <a:rPr lang="cs-CZ" dirty="0">
                 <a:sym typeface="Wingdings" panose="05000000000000000000" pitchFamily="2" charset="2"/>
               </a:rPr>
-              <a:t> V</a:t>
-            </a:r>
-            <a:r>
-              <a:rPr lang="cs-CZ"/>
-              <a:t>yřešení problémů s propojením frameworků + API</a:t>
-            </a:r>
-            <a:endParaRPr lang="cs-CZ" dirty="0"/>
+              <a:t> + v</a:t>
+            </a:r>
+            <a:r>
+              <a:rPr lang="cs-CZ" dirty="0"/>
+              <a:t>yřešení problémů s propojením frameworků a API</a:t>
+            </a:r>
           </a:p>
           <a:p>
             <a:pPr>
@@ -3664,7 +3663,7 @@
 </file>
 
 <file path=ppt/slides/slide11.xml><?xml version="1.0" encoding="utf-8"?>
-<p:sld xmlns:a="http://schemas.openxmlformats.org/drawingml/2006/main" xmlns:r="http://schemas.openxmlformats.org/officeDocument/2006/relationships" xmlns:p="http://schemas.openxmlformats.org/presentationml/2006/main">
+<p:sld xmlns:a="http://schemas.openxmlformats.org/drawingml/2006/main" xmlns:r="http://schemas.openxmlformats.org/officeDocument/2006/relationships" xmlns:p="http://schemas.openxmlformats.org/presentationml/2006/main" show="0">
   <p:cSld>
     <p:spTree>
       <p:nvGrpSpPr>
@@ -4097,7 +4096,7 @@
             </a:pPr>
             <a:r>
               <a:rPr lang="cs-CZ" dirty="0"/>
-              <a:t>Speciální pedagožka PaedDr. Jana Rodová</a:t>
+              <a:t>Cíl: rozvoj dovedností pro přípravu na školní docházku</a:t>
             </a:r>
           </a:p>
           <a:p>
@@ -4108,7 +4107,7 @@
             </a:pPr>
             <a:r>
               <a:rPr lang="cs-CZ" dirty="0"/>
-              <a:t>Cíl: rozvoj dovedností pro přípravu na školní docházku</a:t>
+              <a:t>Speciální pedagožka PaedDr. Jana Rodová</a:t>
             </a:r>
           </a:p>
           <a:p>
@@ -4119,18 +4118,7 @@
             </a:pPr>
             <a:r>
               <a:rPr lang="cs-CZ" dirty="0"/>
-              <a:t>Individuální/skupinové kurzy</a:t>
-            </a:r>
-          </a:p>
-          <a:p>
-            <a:pPr>
-              <a:lnSpc>
-                <a:spcPct val="150000"/>
-              </a:lnSpc>
-            </a:pPr>
-            <a:r>
-              <a:rPr lang="cs-CZ" dirty="0"/>
-              <a:t>Moderní ověřené postupy a metodiky (v ČR relativně nové)</a:t>
+              <a:t>Moderní ověřené postupy a metody (v ČR relativně nové)</a:t>
             </a:r>
           </a:p>
         </p:txBody>
@@ -4235,22 +4223,7 @@
             </a:pPr>
             <a:r>
               <a:rPr lang="cs-CZ" b="1" dirty="0"/>
-              <a:t>Analýza</a:t>
-            </a:r>
-            <a:r>
-              <a:rPr lang="cs-CZ" dirty="0"/>
-              <a:t> (stávající řešení, možnosti řešení)</a:t>
-            </a:r>
-          </a:p>
-          <a:p>
-            <a:pPr>
-              <a:lnSpc>
-                <a:spcPct val="150000"/>
-              </a:lnSpc>
-            </a:pPr>
-            <a:r>
-              <a:rPr lang="cs-CZ" b="1" dirty="0"/>
-              <a:t>Návrh</a:t>
+              <a:t>Analýza, návrh</a:t>
             </a:r>
             <a:r>
               <a:rPr lang="cs-CZ" dirty="0"/>
@@ -4694,7 +4667,7 @@
         <p:spPr/>
         <p:txBody>
           <a:bodyPr>
-            <a:normAutofit/>
+            <a:normAutofit fontScale="92500" lnSpcReduction="10000"/>
           </a:bodyPr>
           <a:lstStyle/>
           <a:p>
@@ -4705,15 +4678,15 @@
             </a:pPr>
             <a:r>
               <a:rPr lang="cs-CZ" b="1" dirty="0"/>
-              <a:t>Server</a:t>
+              <a:t>Server:</a:t>
             </a:r>
             <a:r>
               <a:rPr lang="cs-CZ" dirty="0"/>
-              <a:t> – Python 3 s </a:t>
+              <a:t> Python 3 + </a:t>
             </a:r>
             <a:r>
               <a:rPr lang="cs-CZ" dirty="0" err="1"/>
-              <a:t>Djangem</a:t>
+              <a:t>Django</a:t>
             </a:r>
             <a:r>
               <a:rPr lang="cs-CZ" dirty="0"/>
@@ -4764,22 +4737,58 @@
               <a:t>Klient</a:t>
             </a:r>
             <a:r>
+              <a:rPr lang="cs-CZ" b="1" dirty="0">
+                <a:sym typeface="Wingdings" panose="05000000000000000000" pitchFamily="2" charset="2"/>
+              </a:rPr>
+              <a:t>:</a:t>
+            </a:r>
+            <a:r>
               <a:rPr lang="en-US" dirty="0">
                 <a:sym typeface="Wingdings" panose="05000000000000000000" pitchFamily="2" charset="2"/>
               </a:rPr>
-              <a:t> – JS s </a:t>
+              <a:t> JS </a:t>
+            </a:r>
+            <a:r>
+              <a:rPr lang="cs-CZ" dirty="0">
+                <a:sym typeface="Wingdings" panose="05000000000000000000" pitchFamily="2" charset="2"/>
+              </a:rPr>
+              <a:t>+</a:t>
+            </a:r>
+            <a:r>
+              <a:rPr lang="en-US" dirty="0">
+                <a:sym typeface="Wingdings" panose="05000000000000000000" pitchFamily="2" charset="2"/>
+              </a:rPr>
+              <a:t> </a:t>
             </a:r>
             <a:r>
               <a:rPr lang="en-US" dirty="0" err="1">
                 <a:sym typeface="Wingdings" panose="05000000000000000000" pitchFamily="2" charset="2"/>
               </a:rPr>
-              <a:t>Reactem</a:t>
+              <a:t>Reac</a:t>
+            </a:r>
+            <a:r>
+              <a:rPr lang="cs-CZ" dirty="0">
+                <a:sym typeface="Wingdings" panose="05000000000000000000" pitchFamily="2" charset="2"/>
+              </a:rPr>
+              <a:t>t</a:t>
             </a:r>
             <a:r>
               <a:rPr lang="en-US" dirty="0">
                 <a:sym typeface="Wingdings" panose="05000000000000000000" pitchFamily="2" charset="2"/>
               </a:rPr>
-              <a:t> (+ JSX</a:t>
+              <a:t> (</a:t>
+            </a:r>
+            <a:r>
+              <a:rPr lang="cs-CZ" dirty="0">
+                <a:sym typeface="Wingdings" panose="05000000000000000000" pitchFamily="2" charset="2"/>
+              </a:rPr>
+              <a:t>+</a:t>
+            </a:r>
+            <a:r>
+              <a:rPr lang="en-US" dirty="0">
+                <a:sym typeface="Wingdings" panose="05000000000000000000" pitchFamily="2" charset="2"/>
+              </a:rPr>
+              <a:t> JSX</a:t>
             </a:r>
             <a:r>
               <a:rPr lang="cs-CZ" dirty="0">
@@ -4797,19 +4806,11 @@
               <a:rPr lang="en-US" dirty="0">
                 <a:sym typeface="Wingdings" panose="05000000000000000000" pitchFamily="2" charset="2"/>
               </a:rPr>
-              <a:t>)  </a:t>
-            </a:r>
-            <a:r>
-              <a:rPr lang="en-US" dirty="0">
-                <a:solidFill>
-                  <a:schemeClr val="accent5">
-                    <a:lumMod val="75000"/>
-                  </a:schemeClr>
-                </a:solidFill>
-                <a:sym typeface="Wingdings" panose="05000000000000000000" pitchFamily="2" charset="2"/>
-              </a:rPr>
-              <a:t>SPA</a:t>
-            </a:r>
+              <a:t>)</a:t>
+            </a:r>
+            <a:endParaRPr lang="cs-CZ" dirty="0">
+              <a:sym typeface="Wingdings" panose="05000000000000000000" pitchFamily="2" charset="2"/>
+            </a:endParaRPr>
           </a:p>
           <a:p>
             <a:pPr marL="457200" lvl="1" indent="0">
@@ -4825,6 +4826,18 @@
               <a:t> </a:t>
             </a:r>
             <a:r>
+              <a:rPr lang="cs-CZ" u="sng" dirty="0">
+                <a:sym typeface="Wingdings" panose="05000000000000000000" pitchFamily="2" charset="2"/>
+              </a:rPr>
+              <a:t>SPA</a:t>
+            </a:r>
+            <a:r>
+              <a:rPr lang="cs-CZ" dirty="0">
+                <a:sym typeface="Wingdings" panose="05000000000000000000" pitchFamily="2" charset="2"/>
+              </a:rPr>
+              <a:t>: </a:t>
+            </a:r>
+            <a:r>
               <a:rPr lang="en-US" dirty="0" err="1">
                 <a:sym typeface="Wingdings" panose="05000000000000000000" pitchFamily="2" charset="2"/>
               </a:rPr>
@@ -4834,7 +4847,24 @@
               <a:rPr lang="en-US" dirty="0">
                 <a:sym typeface="Wingdings" panose="05000000000000000000" pitchFamily="2" charset="2"/>
               </a:rPr>
-              <a:t>, Bootstrap (</a:t>
+              <a:t>, React Router…</a:t>
+            </a:r>
+            <a:endParaRPr lang="cs-CZ" u="sng" dirty="0">
+              <a:sym typeface="Wingdings" panose="05000000000000000000" pitchFamily="2" charset="2"/>
+            </a:endParaRPr>
+          </a:p>
+          <a:p>
+            <a:pPr marL="457200" lvl="1" indent="0">
+              <a:lnSpc>
+                <a:spcPct val="150000"/>
+              </a:lnSpc>
+              <a:buNone/>
+            </a:pPr>
+            <a:r>
+              <a:rPr lang="en-US" dirty="0">
+                <a:sym typeface="Wingdings" panose="05000000000000000000" pitchFamily="2" charset="2"/>
+              </a:rPr>
+              <a:t> Bootstrap (</a:t>
             </a:r>
             <a:r>
               <a:rPr lang="en-US" dirty="0" err="1">
@@ -4846,8 +4876,11 @@
               <a:rPr lang="en-US" dirty="0">
                 <a:sym typeface="Wingdings" panose="05000000000000000000" pitchFamily="2" charset="2"/>
               </a:rPr>
-              <a:t>), React Router…</a:t>
-            </a:r>
+              <a:t>)</a:t>
+            </a:r>
+            <a:endParaRPr lang="en-US" u="sng" dirty="0">
+              <a:sym typeface="Wingdings" panose="05000000000000000000" pitchFamily="2" charset="2"/>
+            </a:endParaRPr>
           </a:p>
           <a:p>
             <a:pPr>
@@ -4862,10 +4895,16 @@
               <a:t>DB</a:t>
             </a:r>
             <a:r>
+              <a:rPr lang="cs-CZ" b="1" dirty="0">
+                <a:sym typeface="Wingdings" panose="05000000000000000000" pitchFamily="2" charset="2"/>
+              </a:rPr>
+              <a:t>:</a:t>
+            </a:r>
+            <a:r>
               <a:rPr lang="en-US" dirty="0">
                 <a:sym typeface="Wingdings" panose="05000000000000000000" pitchFamily="2" charset="2"/>
               </a:rPr>
-              <a:t> – PostgreSQL</a:t>
+              <a:t> PostgreSQL</a:t>
             </a:r>
             <a:r>
               <a:rPr lang="cs-CZ" dirty="0">
@@ -4890,10 +4929,16 @@
               <a:t>Hosting</a:t>
             </a:r>
             <a:r>
+              <a:rPr lang="cs-CZ" b="1" dirty="0">
+                <a:sym typeface="Wingdings" panose="05000000000000000000" pitchFamily="2" charset="2"/>
+              </a:rPr>
+              <a:t>:</a:t>
+            </a:r>
+            <a:r>
               <a:rPr lang="en-US" dirty="0">
                 <a:sym typeface="Wingdings" panose="05000000000000000000" pitchFamily="2" charset="2"/>
               </a:rPr>
-              <a:t> – PaaS Heroku</a:t>
+              <a:t> PaaS Heroku</a:t>
             </a:r>
             <a:endParaRPr lang="cs-CZ" dirty="0">
               <a:sym typeface="Wingdings" panose="05000000000000000000" pitchFamily="2" charset="2"/>
@@ -4987,11 +5032,11 @@
             </a:pPr>
             <a:r>
               <a:rPr lang="cs-CZ" b="1" dirty="0"/>
-              <a:t>IDE</a:t>
+              <a:t>IDE:</a:t>
             </a:r>
             <a:r>
               <a:rPr lang="cs-CZ" dirty="0"/>
-              <a:t> – </a:t>
+              <a:t> </a:t>
             </a:r>
             <a:r>
               <a:rPr lang="cs-CZ" dirty="0" err="1"/>
@@ -5015,11 +5060,11 @@
             </a:pPr>
             <a:r>
               <a:rPr lang="cs-CZ" b="1" dirty="0"/>
-              <a:t>CVS</a:t>
+              <a:t>CVS:</a:t>
             </a:r>
             <a:r>
               <a:rPr lang="cs-CZ" dirty="0"/>
-              <a:t> – </a:t>
+              <a:t> </a:t>
             </a:r>
             <a:r>
               <a:rPr lang="cs-CZ" dirty="0" err="1"/>
@@ -5035,11 +5080,11 @@
             </a:pPr>
             <a:r>
               <a:rPr lang="cs-CZ" b="1" dirty="0"/>
-              <a:t>CI + CD </a:t>
+              <a:t>CI + CD:</a:t>
             </a:r>
             <a:r>
               <a:rPr lang="cs-CZ" dirty="0"/>
-              <a:t>– </a:t>
+              <a:t> </a:t>
             </a:r>
             <a:r>
               <a:rPr lang="cs-CZ" dirty="0" err="1"/>
@@ -5058,11 +5103,11 @@
             </a:pPr>
             <a:r>
               <a:rPr lang="cs-CZ" b="1" dirty="0"/>
-              <a:t>Bezpečnost</a:t>
+              <a:t>Bezpečnost:</a:t>
             </a:r>
             <a:r>
               <a:rPr lang="cs-CZ" dirty="0"/>
-              <a:t> – JWT (JSON Web </a:t>
+              <a:t> JWT (JSON Web </a:t>
             </a:r>
             <a:r>
               <a:rPr lang="cs-CZ" dirty="0" err="1"/>

</xml_diff>